<commit_message>
edit presentation 3color-paterson-crossover.pptx and figs 3color-crossover-figs.pptx
</commit_message>
<xml_diff>
--- a/spring18/slidesS18/3color-crossover-figs.pptx
+++ b/spring18/slidesS18/3color-crossover-figs.pptx
@@ -273,7 +273,7 @@
           <a:p>
             <a:fld id="{FDCBEF8B-90E1-2246-9902-954EFD0D60B7}" type="datetimeFigureOut">
               <a:rPr lang="en-US" smtClean="0"/>
-              <a:t>4/10/18</a:t>
+              <a:t>4/11/18</a:t>
             </a:fld>
             <a:endParaRPr lang="en-US"/>
           </a:p>
@@ -471,7 +471,7 @@
           <a:p>
             <a:fld id="{FDCBEF8B-90E1-2246-9902-954EFD0D60B7}" type="datetimeFigureOut">
               <a:rPr lang="en-US" smtClean="0"/>
-              <a:t>4/10/18</a:t>
+              <a:t>4/11/18</a:t>
             </a:fld>
             <a:endParaRPr lang="en-US"/>
           </a:p>
@@ -679,7 +679,7 @@
           <a:p>
             <a:fld id="{FDCBEF8B-90E1-2246-9902-954EFD0D60B7}" type="datetimeFigureOut">
               <a:rPr lang="en-US" smtClean="0"/>
-              <a:t>4/10/18</a:t>
+              <a:t>4/11/18</a:t>
             </a:fld>
             <a:endParaRPr lang="en-US"/>
           </a:p>
@@ -877,7 +877,7 @@
           <a:p>
             <a:fld id="{FDCBEF8B-90E1-2246-9902-954EFD0D60B7}" type="datetimeFigureOut">
               <a:rPr lang="en-US" smtClean="0"/>
-              <a:t>4/10/18</a:t>
+              <a:t>4/11/18</a:t>
             </a:fld>
             <a:endParaRPr lang="en-US"/>
           </a:p>
@@ -1152,7 +1152,7 @@
           <a:p>
             <a:fld id="{FDCBEF8B-90E1-2246-9902-954EFD0D60B7}" type="datetimeFigureOut">
               <a:rPr lang="en-US" smtClean="0"/>
-              <a:t>4/10/18</a:t>
+              <a:t>4/11/18</a:t>
             </a:fld>
             <a:endParaRPr lang="en-US"/>
           </a:p>
@@ -1417,7 +1417,7 @@
           <a:p>
             <a:fld id="{FDCBEF8B-90E1-2246-9902-954EFD0D60B7}" type="datetimeFigureOut">
               <a:rPr lang="en-US" smtClean="0"/>
-              <a:t>4/10/18</a:t>
+              <a:t>4/11/18</a:t>
             </a:fld>
             <a:endParaRPr lang="en-US"/>
           </a:p>
@@ -1829,7 +1829,7 @@
           <a:p>
             <a:fld id="{FDCBEF8B-90E1-2246-9902-954EFD0D60B7}" type="datetimeFigureOut">
               <a:rPr lang="en-US" smtClean="0"/>
-              <a:t>4/10/18</a:t>
+              <a:t>4/11/18</a:t>
             </a:fld>
             <a:endParaRPr lang="en-US"/>
           </a:p>
@@ -1970,7 +1970,7 @@
           <a:p>
             <a:fld id="{FDCBEF8B-90E1-2246-9902-954EFD0D60B7}" type="datetimeFigureOut">
               <a:rPr lang="en-US" smtClean="0"/>
-              <a:t>4/10/18</a:t>
+              <a:t>4/11/18</a:t>
             </a:fld>
             <a:endParaRPr lang="en-US"/>
           </a:p>
@@ -2083,7 +2083,7 @@
           <a:p>
             <a:fld id="{FDCBEF8B-90E1-2246-9902-954EFD0D60B7}" type="datetimeFigureOut">
               <a:rPr lang="en-US" smtClean="0"/>
-              <a:t>4/10/18</a:t>
+              <a:t>4/11/18</a:t>
             </a:fld>
             <a:endParaRPr lang="en-US"/>
           </a:p>
@@ -2394,7 +2394,7 @@
           <a:p>
             <a:fld id="{FDCBEF8B-90E1-2246-9902-954EFD0D60B7}" type="datetimeFigureOut">
               <a:rPr lang="en-US" smtClean="0"/>
-              <a:t>4/10/18</a:t>
+              <a:t>4/11/18</a:t>
             </a:fld>
             <a:endParaRPr lang="en-US"/>
           </a:p>
@@ -2682,7 +2682,7 @@
           <a:p>
             <a:fld id="{FDCBEF8B-90E1-2246-9902-954EFD0D60B7}" type="datetimeFigureOut">
               <a:rPr lang="en-US" smtClean="0"/>
-              <a:t>4/10/18</a:t>
+              <a:t>4/11/18</a:t>
             </a:fld>
             <a:endParaRPr lang="en-US"/>
           </a:p>
@@ -2923,7 +2923,7 @@
           <a:p>
             <a:fld id="{FDCBEF8B-90E1-2246-9902-954EFD0D60B7}" type="datetimeFigureOut">
               <a:rPr lang="en-US" smtClean="0"/>
-              <a:t>4/10/18</a:t>
+              <a:t>4/11/18</a:t>
             </a:fld>
             <a:endParaRPr lang="en-US"/>
           </a:p>
@@ -7290,7 +7290,11 @@
             <a:prstGeom prst="line">
               <a:avLst/>
             </a:prstGeom>
-            <a:ln w="44450"/>
+            <a:ln w="44450">
+              <a:solidFill>
+                <a:schemeClr val="tx1"/>
+              </a:solidFill>
+            </a:ln>
           </p:spPr>
           <p:style>
             <a:lnRef idx="1">
@@ -7350,7 +7354,11 @@
               <a:prstGeom prst="line">
                 <a:avLst/>
               </a:prstGeom>
-              <a:ln w="44450"/>
+              <a:ln w="44450">
+                <a:solidFill>
+                  <a:schemeClr val="tx1"/>
+                </a:solidFill>
+              </a:ln>
             </p:spPr>
             <p:style>
               <a:lnRef idx="1">
@@ -7436,7 +7444,11 @@
                 </a:pathLst>
               </a:custGeom>
               <a:noFill/>
-              <a:ln w="44450"/>
+              <a:ln w="44450">
+                <a:solidFill>
+                  <a:schemeClr val="tx1"/>
+                </a:solidFill>
+              </a:ln>
             </p:spPr>
             <p:style>
               <a:lnRef idx="2">
@@ -7485,7 +7497,11 @@
               <a:prstGeom prst="line">
                 <a:avLst/>
               </a:prstGeom>
-              <a:ln w="44450"/>
+              <a:ln w="44450">
+                <a:solidFill>
+                  <a:schemeClr val="tx1"/>
+                </a:solidFill>
+              </a:ln>
             </p:spPr>
             <p:style>
               <a:lnRef idx="1">
@@ -7546,7 +7562,11 @@
             <a:prstGeom prst="line">
               <a:avLst/>
             </a:prstGeom>
-            <a:ln w="44450"/>
+            <a:ln w="44450">
+              <a:solidFill>
+                <a:schemeClr val="tx1"/>
+              </a:solidFill>
+            </a:ln>
           </p:spPr>
           <p:style>
             <a:lnRef idx="1">
@@ -7585,7 +7605,11 @@
             <a:prstGeom prst="line">
               <a:avLst/>
             </a:prstGeom>
-            <a:ln w="44450"/>
+            <a:ln w="44450">
+              <a:solidFill>
+                <a:schemeClr val="tx1"/>
+              </a:solidFill>
+            </a:ln>
           </p:spPr>
           <p:style>
             <a:lnRef idx="1">
@@ -7624,7 +7648,11 @@
             <a:prstGeom prst="line">
               <a:avLst/>
             </a:prstGeom>
-            <a:ln w="44450"/>
+            <a:ln w="44450">
+              <a:solidFill>
+                <a:schemeClr val="tx1"/>
+              </a:solidFill>
+            </a:ln>
           </p:spPr>
           <p:style>
             <a:lnRef idx="1">
@@ -9552,7 +9580,11 @@
             <a:prstGeom prst="line">
               <a:avLst/>
             </a:prstGeom>
-            <a:ln w="44450"/>
+            <a:ln w="44450">
+              <a:solidFill>
+                <a:schemeClr val="tx1"/>
+              </a:solidFill>
+            </a:ln>
           </p:spPr>
           <p:style>
             <a:lnRef idx="1">

</xml_diff>

<commit_message>
format figures in graph problems
</commit_message>
<xml_diff>
--- a/spring18/slidesS18/3color-crossover-figs.pptx
+++ b/spring18/slidesS18/3color-crossover-figs.pptx
@@ -7263,9 +7263,9 @@
         <p:grpSpPr>
           <a:xfrm>
             <a:off x="2336345" y="1968265"/>
-            <a:ext cx="2921457" cy="2908537"/>
+            <a:ext cx="2874511" cy="2908537"/>
             <a:chOff x="3457575" y="1042977"/>
-            <a:chExt cx="5186363" cy="4800600"/>
+            <a:chExt cx="5103021" cy="4800600"/>
           </a:xfrm>
         </p:grpSpPr>
         <p:cxnSp>
@@ -7326,9 +7326,9 @@
           <p:grpSpPr>
             <a:xfrm>
               <a:off x="3457575" y="3100383"/>
-              <a:ext cx="5186363" cy="371475"/>
+              <a:ext cx="5103021" cy="371475"/>
               <a:chOff x="3457575" y="3100383"/>
-              <a:chExt cx="5186363" cy="371475"/>
+              <a:chExt cx="5103021" cy="371475"/>
             </a:xfrm>
           </p:grpSpPr>
           <p:cxnSp>
@@ -7491,8 +7491,8 @@
             </p:nvCxnSpPr>
             <p:spPr>
               <a:xfrm flipH="1">
-                <a:off x="6400800" y="3429000"/>
-                <a:ext cx="2243138" cy="0"/>
+                <a:off x="6317459" y="3429001"/>
+                <a:ext cx="2243137" cy="0"/>
               </a:xfrm>
               <a:prstGeom prst="line">
                 <a:avLst/>

</xml_diff>